<commit_message>
edit trees-coloring.pptx, animate trees-spanning.pptx
</commit_message>
<xml_diff>
--- a/spring12/slidesS12/trees-coloring.pptx
+++ b/spring12/slidesS12/trees-coloring.pptx
@@ -12,8 +12,8 @@
   </p:handoutMasterIdLst>
   <p:sldIdLst>
     <p:sldId id="990" r:id="rId2"/>
-    <p:sldId id="1042" r:id="rId3"/>
-    <p:sldId id="1044" r:id="rId4"/>
+    <p:sldId id="1044" r:id="rId3"/>
+    <p:sldId id="1042" r:id="rId4"/>
     <p:sldId id="1043" r:id="rId5"/>
   </p:sldIdLst>
   <p:sldSz cx="9144000" cy="6858000" type="screen4x3"/>
@@ -932,6 +932,90 @@
       </p:grpSpPr>
       <p:sp>
         <p:nvSpPr>
+          <p:cNvPr id="7" name="Rectangle 7"/>
+          <p:cNvSpPr>
+            <a:spLocks noGrp="1" noChangeArrowheads="1"/>
+          </p:cNvSpPr>
+          <p:nvPr>
+            <p:ph type="sldNum" sz="quarter" idx="5"/>
+          </p:nvPr>
+        </p:nvSpPr>
+        <p:spPr>
+          <a:ln/>
+        </p:spPr>
+        <p:txBody>
+          <a:bodyPr/>
+          <a:lstStyle/>
+          <a:p>
+            <a:fld id="{95C544F9-5295-4B65-BDA8-0C45EE7D8852}" type="slidenum">
+              <a:rPr lang="en-US"/>
+              <a:pPr/>
+              <a:t>2</a:t>
+            </a:fld>
+            <a:endParaRPr lang="en-US"/>
+          </a:p>
+        </p:txBody>
+      </p:sp>
+      <p:sp>
+        <p:nvSpPr>
+          <p:cNvPr id="616450" name="Rectangle 2"/>
+          <p:cNvSpPr>
+            <a:spLocks noGrp="1" noRot="1" noChangeAspect="1" noChangeArrowheads="1" noTextEdit="1"/>
+          </p:cNvSpPr>
+          <p:nvPr>
+            <p:ph type="sldImg"/>
+          </p:nvPr>
+        </p:nvSpPr>
+        <p:spPr>
+          <a:ln/>
+        </p:spPr>
+      </p:sp>
+      <p:sp>
+        <p:nvSpPr>
+          <p:cNvPr id="616451" name="Rectangle 3"/>
+          <p:cNvSpPr>
+            <a:spLocks noGrp="1" noChangeArrowheads="1"/>
+          </p:cNvSpPr>
+          <p:nvPr>
+            <p:ph type="body" idx="1"/>
+          </p:nvPr>
+        </p:nvSpPr>
+        <p:spPr/>
+        <p:txBody>
+          <a:bodyPr/>
+          <a:lstStyle/>
+          <a:p>
+            <a:endParaRPr lang="en-US"/>
+          </a:p>
+        </p:txBody>
+      </p:sp>
+    </p:spTree>
+  </p:cSld>
+  <p:clrMapOvr>
+    <a:masterClrMapping/>
+  </p:clrMapOvr>
+</p:notes>
+</file>
+
+<file path=ppt/notesSlides/notesSlide3.xml><?xml version="1.0" encoding="utf-8"?>
+<p:notes xmlns:a="http://schemas.openxmlformats.org/drawingml/2006/main" xmlns:r="http://schemas.openxmlformats.org/officeDocument/2006/relationships" xmlns:p="http://schemas.openxmlformats.org/presentationml/2006/main">
+  <p:cSld>
+    <p:spTree>
+      <p:nvGrpSpPr>
+        <p:cNvPr id="1" name=""/>
+        <p:cNvGrpSpPr/>
+        <p:nvPr/>
+      </p:nvGrpSpPr>
+      <p:grpSpPr>
+        <a:xfrm>
+          <a:off x="0" y="0"/>
+          <a:ext cx="0" cy="0"/>
+          <a:chOff x="0" y="0"/>
+          <a:chExt cx="0" cy="0"/>
+        </a:xfrm>
+      </p:grpSpPr>
+      <p:sp>
+        <p:nvSpPr>
           <p:cNvPr id="71682" name="Rectangle 2"/>
           <p:cNvSpPr>
             <a:spLocks noGrp="1" noRot="1" noChangeAspect="1" noChangeArrowheads="1" noTextEdit="1"/>
@@ -974,90 +1058,6 @@
             <a:endParaRPr lang="en-US" smtClean="0">
               <a:latin typeface="Times New Roman" pitchFamily="8" charset="0"/>
             </a:endParaRPr>
-          </a:p>
-        </p:txBody>
-      </p:sp>
-    </p:spTree>
-  </p:cSld>
-  <p:clrMapOvr>
-    <a:masterClrMapping/>
-  </p:clrMapOvr>
-</p:notes>
-</file>
-
-<file path=ppt/notesSlides/notesSlide3.xml><?xml version="1.0" encoding="utf-8"?>
-<p:notes xmlns:a="http://schemas.openxmlformats.org/drawingml/2006/main" xmlns:r="http://schemas.openxmlformats.org/officeDocument/2006/relationships" xmlns:p="http://schemas.openxmlformats.org/presentationml/2006/main">
-  <p:cSld>
-    <p:spTree>
-      <p:nvGrpSpPr>
-        <p:cNvPr id="1" name=""/>
-        <p:cNvGrpSpPr/>
-        <p:nvPr/>
-      </p:nvGrpSpPr>
-      <p:grpSpPr>
-        <a:xfrm>
-          <a:off x="0" y="0"/>
-          <a:ext cx="0" cy="0"/>
-          <a:chOff x="0" y="0"/>
-          <a:chExt cx="0" cy="0"/>
-        </a:xfrm>
-      </p:grpSpPr>
-      <p:sp>
-        <p:nvSpPr>
-          <p:cNvPr id="7" name="Rectangle 7"/>
-          <p:cNvSpPr>
-            <a:spLocks noGrp="1" noChangeArrowheads="1"/>
-          </p:cNvSpPr>
-          <p:nvPr>
-            <p:ph type="sldNum" sz="quarter" idx="5"/>
-          </p:nvPr>
-        </p:nvSpPr>
-        <p:spPr>
-          <a:ln/>
-        </p:spPr>
-        <p:txBody>
-          <a:bodyPr/>
-          <a:lstStyle/>
-          <a:p>
-            <a:fld id="{95C544F9-5295-4B65-BDA8-0C45EE7D8852}" type="slidenum">
-              <a:rPr lang="en-US"/>
-              <a:pPr/>
-              <a:t>3</a:t>
-            </a:fld>
-            <a:endParaRPr lang="en-US"/>
-          </a:p>
-        </p:txBody>
-      </p:sp>
-      <p:sp>
-        <p:nvSpPr>
-          <p:cNvPr id="616450" name="Rectangle 2"/>
-          <p:cNvSpPr>
-            <a:spLocks noGrp="1" noRot="1" noChangeAspect="1" noChangeArrowheads="1" noTextEdit="1"/>
-          </p:cNvSpPr>
-          <p:nvPr>
-            <p:ph type="sldImg"/>
-          </p:nvPr>
-        </p:nvSpPr>
-        <p:spPr>
-          <a:ln/>
-        </p:spPr>
-      </p:sp>
-      <p:sp>
-        <p:nvSpPr>
-          <p:cNvPr id="616451" name="Rectangle 3"/>
-          <p:cNvSpPr>
-            <a:spLocks noGrp="1" noChangeArrowheads="1"/>
-          </p:cNvSpPr>
-          <p:nvPr>
-            <p:ph type="body" idx="1"/>
-          </p:nvPr>
-        </p:nvSpPr>
-        <p:spPr/>
-        <p:txBody>
-          <a:bodyPr/>
-          <a:lstStyle/>
-          <a:p>
-            <a:endParaRPr lang="en-US"/>
           </a:p>
         </p:txBody>
       </p:sp>
@@ -2800,7 +2800,7 @@
           <a:p>
             <a:pPr algn="ctr" eaLnBrk="0" hangingPunct="0"/>
             <a:r>
-              <a:rPr lang="en-US" sz="13800" b="1" dirty="0" smtClean="0">
+              <a:rPr lang="en-US" sz="11500" b="1" dirty="0" smtClean="0">
                 <a:solidFill>
                   <a:schemeClr val="tx2"/>
                 </a:solidFill>
@@ -2813,7 +2813,7 @@
           <a:p>
             <a:pPr algn="ctr" eaLnBrk="0" hangingPunct="0"/>
             <a:r>
-              <a:rPr lang="en-US" sz="13800" b="1" smtClean="0">
+              <a:rPr lang="en-US" sz="11500" b="1" dirty="0" smtClean="0">
                 <a:solidFill>
                   <a:schemeClr val="tx2"/>
                 </a:solidFill>
@@ -2822,13 +2822,6 @@
               </a:rPr>
               <a:t>coloring</a:t>
             </a:r>
-            <a:endParaRPr lang="en-US" sz="13800" b="1" dirty="0" smtClean="0">
-              <a:solidFill>
-                <a:schemeClr val="tx2"/>
-              </a:solidFill>
-              <a:latin typeface="Comic Sans MS"/>
-              <a:cs typeface="Comic Sans MS"/>
-            </a:endParaRPr>
           </a:p>
         </p:txBody>
       </p:sp>
@@ -3006,6 +2999,276 @@
       </p:grpSpPr>
       <p:sp>
         <p:nvSpPr>
+          <p:cNvPr id="4" name="Slide Number Placeholder 3"/>
+          <p:cNvSpPr>
+            <a:spLocks noGrp="1"/>
+          </p:cNvSpPr>
+          <p:nvPr>
+            <p:ph type="sldNum" sz="quarter" idx="10"/>
+          </p:nvPr>
+        </p:nvSpPr>
+        <p:spPr/>
+        <p:txBody>
+          <a:bodyPr/>
+          <a:lstStyle/>
+          <a:p>
+            <a:r>
+              <a:rPr lang="en-US" dirty="0" err="1"/>
+              <a:t>lec</a:t>
+            </a:r>
+            <a:r>
+              <a:rPr lang="en-US" dirty="0" smtClean="0"/>
+              <a:t> 8W.</a:t>
+            </a:r>
+            <a:fld id="{8CB76801-ECFD-4E75-B29A-84CDB3DBBAA0}" type="slidenum">
+              <a:rPr lang="en-US" smtClean="0"/>
+              <a:pPr/>
+              <a:t>2</a:t>
+            </a:fld>
+            <a:endParaRPr lang="en-US" dirty="0"/>
+          </a:p>
+        </p:txBody>
+      </p:sp>
+      <p:sp>
+        <p:nvSpPr>
+          <p:cNvPr id="572418" name="Rectangle 2"/>
+          <p:cNvSpPr>
+            <a:spLocks noGrp="1" noChangeArrowheads="1"/>
+          </p:cNvSpPr>
+          <p:nvPr>
+            <p:ph type="title"/>
+          </p:nvPr>
+        </p:nvSpPr>
+        <p:spPr>
+          <a:xfrm>
+            <a:off x="1772250" y="139064"/>
+            <a:ext cx="5653263" cy="1297893"/>
+          </a:xfrm>
+          <a:noFill/>
+          <a:ln/>
+        </p:spPr>
+        <p:txBody>
+          <a:bodyPr/>
+          <a:lstStyle/>
+          <a:p>
+            <a:r>
+              <a:rPr lang="en-US" sz="6600" dirty="0" smtClean="0"/>
+              <a:t>unique paths</a:t>
+            </a:r>
+            <a:endParaRPr lang="en-US" sz="6600" dirty="0"/>
+          </a:p>
+        </p:txBody>
+      </p:sp>
+      <p:sp>
+        <p:nvSpPr>
+          <p:cNvPr id="7" name="Rectangle 3"/>
+          <p:cNvSpPr txBox="1">
+            <a:spLocks noChangeArrowheads="1"/>
+          </p:cNvSpPr>
+          <p:nvPr/>
+        </p:nvSpPr>
+        <p:spPr bwMode="auto">
+          <a:xfrm>
+            <a:off x="290289" y="1901752"/>
+            <a:ext cx="8580292" cy="3096609"/>
+          </a:xfrm>
+          <a:prstGeom prst="rect">
+            <a:avLst/>
+          </a:prstGeom>
+          <a:noFill/>
+          <a:ln w="9525">
+            <a:noFill/>
+            <a:miter lim="800000"/>
+            <a:headEnd/>
+            <a:tailEnd/>
+          </a:ln>
+        </p:spPr>
+        <p:txBody>
+          <a:bodyPr vert="horz" wrap="square" lIns="91440" tIns="45720" rIns="91440" bIns="45720" numCol="1" anchor="t" anchorCtr="0" compatLnSpc="1">
+            <a:prstTxWarp prst="textNoShape">
+              <a:avLst/>
+            </a:prstTxWarp>
+          </a:bodyPr>
+          <a:lstStyle/>
+          <a:p>
+            <a:pPr marL="342900" marR="0" lvl="0" indent="-342900" algn="l" defTabSz="914400" rtl="0" eaLnBrk="1" fontAlgn="base" latinLnBrk="0" hangingPunct="1">
+              <a:lnSpc>
+                <a:spcPct val="100000"/>
+              </a:lnSpc>
+              <a:spcBef>
+                <a:spcPct val="20000"/>
+              </a:spcBef>
+              <a:spcAft>
+                <a:spcPct val="0"/>
+              </a:spcAft>
+              <a:buClrTx/>
+              <a:buSzTx/>
+              <a:buFontTx/>
+              <a:buNone/>
+              <a:tabLst/>
+              <a:defRPr/>
+            </a:pPr>
+            <a:r>
+              <a:rPr kumimoji="0" lang="en-US" altLang="zh-CN" sz="6000" b="0" i="0" u="none" strike="noStrike" kern="0" cap="none" spc="0" normalizeH="0" baseline="0" noProof="0" dirty="0" smtClean="0">
+                <a:ln>
+                  <a:noFill/>
+                </a:ln>
+                <a:solidFill>
+                  <a:srgbClr val="000000"/>
+                </a:solidFill>
+                <a:effectLst/>
+                <a:uLnTx/>
+                <a:uFillTx/>
+                <a:latin typeface="+mn-lt"/>
+                <a:ea typeface="宋体" pitchFamily="2" charset="-122"/>
+                <a:cs typeface="+mn-cs"/>
+              </a:rPr>
+              <a:t>A tree i</a:t>
+            </a:r>
+            <a:r>
+              <a:rPr kumimoji="0" lang="en-US" altLang="zh-CN" sz="6000" b="0" i="0" u="none" strike="noStrike" kern="0" cap="none" spc="0" normalizeH="0" baseline="0" noProof="0" dirty="0" smtClean="0">
+                <a:ln>
+                  <a:noFill/>
+                </a:ln>
+                <a:solidFill>
+                  <a:schemeClr val="tx1"/>
+                </a:solidFill>
+                <a:effectLst/>
+                <a:uLnTx/>
+                <a:uFillTx/>
+                <a:latin typeface="+mn-lt"/>
+                <a:ea typeface="宋体" pitchFamily="2" charset="-122"/>
+                <a:cs typeface="+mn-cs"/>
+              </a:rPr>
+              <a:t>s a g</a:t>
+            </a:r>
+            <a:r>
+              <a:rPr kumimoji="0" lang="en-US" altLang="zh-CN" sz="6000" b="0" i="0" u="none" strike="noStrike" kern="0" cap="none" spc="0" normalizeH="0" baseline="0" noProof="0" dirty="0" smtClean="0">
+                <a:ln>
+                  <a:noFill/>
+                </a:ln>
+                <a:solidFill>
+                  <a:srgbClr val="000000"/>
+                </a:solidFill>
+                <a:effectLst/>
+                <a:uLnTx/>
+                <a:uFillTx/>
+                <a:latin typeface="+mn-lt"/>
+                <a:ea typeface="宋体" pitchFamily="2" charset="-122"/>
+                <a:cs typeface="+mn-cs"/>
+              </a:rPr>
+              <a:t>raph with</a:t>
+            </a:r>
+            <a:r>
+              <a:rPr kumimoji="0" lang="en-US" altLang="zh-CN" sz="6000" b="0" i="0" u="none" strike="noStrike" kern="0" cap="none" spc="0" normalizeH="0" noProof="0" dirty="0" smtClean="0">
+                <a:ln>
+                  <a:noFill/>
+                </a:ln>
+                <a:solidFill>
+                  <a:srgbClr val="000000"/>
+                </a:solidFill>
+                <a:effectLst/>
+                <a:uLnTx/>
+                <a:uFillTx/>
+                <a:latin typeface="+mn-lt"/>
+                <a:ea typeface="宋体" pitchFamily="2" charset="-122"/>
+                <a:cs typeface="+mn-cs"/>
+              </a:rPr>
+              <a:t> </a:t>
+            </a:r>
+            <a:r>
+              <a:rPr kumimoji="0" lang="en-US" altLang="zh-CN" sz="6000" b="0" i="0" u="none" strike="noStrike" kern="0" cap="none" spc="0" normalizeH="0" noProof="0" dirty="0" smtClean="0">
+                <a:ln>
+                  <a:noFill/>
+                </a:ln>
+                <a:solidFill>
+                  <a:srgbClr val="C30778"/>
+                </a:solidFill>
+                <a:effectLst/>
+                <a:uLnTx/>
+                <a:uFillTx/>
+                <a:latin typeface="+mn-lt"/>
+                <a:ea typeface="宋体" pitchFamily="2" charset="-122"/>
+                <a:cs typeface="+mn-cs"/>
+              </a:rPr>
+              <a:t>unique paths</a:t>
+            </a:r>
+            <a:r>
+              <a:rPr kumimoji="0" lang="en-US" altLang="zh-CN" sz="6000" b="0" i="0" u="none" strike="noStrike" kern="0" cap="none" spc="0" normalizeH="0" noProof="0" dirty="0" smtClean="0">
+                <a:ln>
+                  <a:noFill/>
+                </a:ln>
+                <a:solidFill>
+                  <a:srgbClr val="000000"/>
+                </a:solidFill>
+                <a:effectLst/>
+                <a:uLnTx/>
+                <a:uFillTx/>
+                <a:latin typeface="+mn-lt"/>
+                <a:ea typeface="宋体" pitchFamily="2" charset="-122"/>
+                <a:cs typeface="+mn-cs"/>
+              </a:rPr>
+              <a:t> between every pair of vertices.</a:t>
+            </a:r>
+            <a:endParaRPr kumimoji="0" lang="en-US" altLang="zh-CN" sz="6000" b="0" i="0" u="none" strike="noStrike" kern="0" cap="none" spc="0" normalizeH="0" baseline="0" noProof="0" dirty="0" smtClean="0">
+              <a:ln>
+                <a:noFill/>
+              </a:ln>
+              <a:solidFill>
+                <a:srgbClr val="000000"/>
+              </a:solidFill>
+              <a:effectLst/>
+              <a:uLnTx/>
+              <a:uFillTx/>
+              <a:latin typeface="+mn-lt"/>
+              <a:ea typeface="宋体" pitchFamily="2" charset="-122"/>
+              <a:cs typeface="+mn-cs"/>
+            </a:endParaRPr>
+          </a:p>
+        </p:txBody>
+      </p:sp>
+    </p:spTree>
+    <p:extLst>
+      <p:ext uri="{BB962C8B-B14F-4D97-AF65-F5344CB8AC3E}">
+        <p14:creationId xmlns:p14="http://schemas.microsoft.com/office/powerpoint/2010/main" val="3363477428"/>
+      </p:ext>
+    </p:extLst>
+  </p:cSld>
+  <p:clrMapOvr>
+    <a:masterClrMapping/>
+  </p:clrMapOvr>
+  <p:transition xmlns:p14="http://schemas.microsoft.com/office/powerpoint/2010/main">
+    <p:fade thruBlk="1"/>
+  </p:transition>
+  <p:timing>
+    <p:tnLst>
+      <p:par>
+        <p:cTn xmlns:p14="http://schemas.microsoft.com/office/powerpoint/2010/main" id="1" dur="indefinite" restart="never" nodeType="tmRoot"/>
+      </p:par>
+    </p:tnLst>
+  </p:timing>
+</p:sld>
+</file>
+
+<file path=ppt/slides/slide3.xml><?xml version="1.0" encoding="utf-8"?>
+<p:sld xmlns:a="http://schemas.openxmlformats.org/drawingml/2006/main" xmlns:r="http://schemas.openxmlformats.org/officeDocument/2006/relationships" xmlns:p="http://schemas.openxmlformats.org/presentationml/2006/main">
+  <p:cSld>
+    <p:spTree>
+      <p:nvGrpSpPr>
+        <p:cNvPr id="1" name=""/>
+        <p:cNvGrpSpPr/>
+        <p:nvPr/>
+      </p:nvGrpSpPr>
+      <p:grpSpPr>
+        <a:xfrm>
+          <a:off x="0" y="0"/>
+          <a:ext cx="0" cy="0"/>
+          <a:chOff x="0" y="0"/>
+          <a:chExt cx="0" cy="0"/>
+        </a:xfrm>
+      </p:grpSpPr>
+      <p:sp>
+        <p:nvSpPr>
           <p:cNvPr id="36866" name="Rectangle 2"/>
           <p:cNvSpPr>
             <a:spLocks noGrp="1" noChangeArrowheads="1"/>
@@ -3113,12 +3376,18 @@
               <a:buNone/>
             </a:pPr>
             <a:r>
-              <a:rPr lang="en-US" sz="5400" i="1" dirty="0" smtClean="0">
+              <a:rPr lang="en-US" sz="5400" dirty="0" smtClean="0">
+                <a:solidFill>
+                  <a:srgbClr val="930093"/>
+                </a:solidFill>
                 <a:sym typeface="Euclid Symbol" pitchFamily="18" charset="2"/>
               </a:rPr>
               <a:t>lemma:</a:t>
             </a:r>
-            <a:endParaRPr lang="en-US" sz="6000" i="1" dirty="0" smtClean="0">
+            <a:endParaRPr lang="en-US" sz="6000" dirty="0" smtClean="0">
+              <a:solidFill>
+                <a:srgbClr val="930093"/>
+              </a:solidFill>
               <a:sym typeface="Euclid Symbol" pitchFamily="18" charset="2"/>
             </a:endParaRPr>
           </a:p>
@@ -3215,7 +3484,7 @@
               <a:pPr>
                 <a:defRPr/>
               </a:pPr>
-              <a:t>2</a:t>
+              <a:t>3</a:t>
             </a:fld>
             <a:endParaRPr lang="en-US" dirty="0"/>
           </a:p>
@@ -3231,9 +3500,18 @@
   <p:clrMapOvr>
     <a:masterClrMapping/>
   </p:clrMapOvr>
-  <p:transition xmlns:p14="http://schemas.microsoft.com/office/powerpoint/2010/main" spd="slow">
-    <p:fade thruBlk="1"/>
-  </p:transition>
+  <mc:AlternateContent xmlns:mc="http://schemas.openxmlformats.org/markup-compatibility/2006">
+    <mc:Choice xmlns:p14="http://schemas.microsoft.com/office/powerpoint/2010/main" Requires="p14">
+      <p:transition spd="med" p14:dur="700">
+        <p:fade/>
+      </p:transition>
+    </mc:Choice>
+    <mc:Fallback>
+      <p:transition xmlns:p14="http://schemas.microsoft.com/office/powerpoint/2010/main" spd="med">
+        <p:fade/>
+      </p:transition>
+    </mc:Fallback>
+  </mc:AlternateContent>
   <p:timing>
     <p:tnLst>
       <p:par>
@@ -3255,7 +3533,7 @@
                             </p:stCondLst>
                             <p:childTnLst>
                               <p:par>
-                                <p:cTn id="5" presetID="9" presetClass="entr" presetSubtype="0" fill="hold" nodeType="clickEffect">
+                                <p:cTn id="5" presetID="1" presetClass="entr" presetSubtype="0" fill="hold" nodeType="clickEffect">
                                   <p:stCondLst>
                                     <p:cond delay="0"/>
                                   </p:stCondLst>
@@ -3263,67 +3541,6 @@
                                     <p:set>
                                       <p:cBhvr>
                                         <p:cTn id="6" dur="1" fill="hold">
-                                          <p:stCondLst>
-                                            <p:cond delay="0"/>
-                                          </p:stCondLst>
-                                        </p:cTn>
-                                        <p:tgtEl>
-                                          <p:spTgt spid="191491">
-                                            <p:txEl>
-                                              <p:pRg st="0" end="0"/>
-                                            </p:txEl>
-                                          </p:spTgt>
-                                        </p:tgtEl>
-                                        <p:attrNameLst>
-                                          <p:attrName>style.visibility</p:attrName>
-                                        </p:attrNameLst>
-                                      </p:cBhvr>
-                                      <p:to>
-                                        <p:strVal val="visible"/>
-                                      </p:to>
-                                    </p:set>
-                                    <p:animEffect transition="in" filter="dissolve">
-                                      <p:cBhvr>
-                                        <p:cTn id="7" dur="500"/>
-                                        <p:tgtEl>
-                                          <p:spTgt spid="191491">
-                                            <p:txEl>
-                                              <p:pRg st="0" end="0"/>
-                                            </p:txEl>
-                                          </p:spTgt>
-                                        </p:tgtEl>
-                                      </p:cBhvr>
-                                    </p:animEffect>
-                                  </p:childTnLst>
-                                </p:cTn>
-                              </p:par>
-                            </p:childTnLst>
-                          </p:cTn>
-                        </p:par>
-                      </p:childTnLst>
-                    </p:cTn>
-                  </p:par>
-                  <p:par>
-                    <p:cTn id="8" fill="hold">
-                      <p:stCondLst>
-                        <p:cond delay="indefinite"/>
-                      </p:stCondLst>
-                      <p:childTnLst>
-                        <p:par>
-                          <p:cTn id="9" fill="hold">
-                            <p:stCondLst>
-                              <p:cond delay="0"/>
-                            </p:stCondLst>
-                            <p:childTnLst>
-                              <p:par>
-                                <p:cTn id="10" presetID="1" presetClass="entr" presetSubtype="0" fill="hold" nodeType="clickEffect">
-                                  <p:stCondLst>
-                                    <p:cond delay="0"/>
-                                  </p:stCondLst>
-                                  <p:childTnLst>
-                                    <p:set>
-                                      <p:cBhvr>
-                                        <p:cTn id="11" dur="1" fill="hold">
                                           <p:stCondLst>
                                             <p:cond delay="0"/>
                                           </p:stCondLst>
@@ -3346,33 +3563,15 @@
                                   </p:childTnLst>
                                 </p:cTn>
                               </p:par>
-                            </p:childTnLst>
-                          </p:cTn>
-                        </p:par>
-                      </p:childTnLst>
-                    </p:cTn>
-                  </p:par>
-                  <p:par>
-                    <p:cTn id="12" fill="hold">
-                      <p:stCondLst>
-                        <p:cond delay="indefinite"/>
-                      </p:stCondLst>
-                      <p:childTnLst>
-                        <p:par>
-                          <p:cTn id="13" fill="hold">
-                            <p:stCondLst>
-                              <p:cond delay="0"/>
-                            </p:stCondLst>
-                            <p:childTnLst>
                               <p:par>
-                                <p:cTn id="14" presetID="22" presetClass="entr" presetSubtype="8" fill="hold" nodeType="clickEffect">
+                                <p:cTn id="7" presetID="22" presetClass="entr" presetSubtype="8" fill="hold" nodeType="withEffect">
                                   <p:stCondLst>
                                     <p:cond delay="0"/>
                                   </p:stCondLst>
                                   <p:childTnLst>
                                     <p:set>
                                       <p:cBhvr>
-                                        <p:cTn id="15" dur="1" fill="hold">
+                                        <p:cTn id="8" dur="1" fill="hold">
                                           <p:stCondLst>
                                             <p:cond delay="0"/>
                                           </p:stCondLst>
@@ -3394,7 +3593,7 @@
                                     </p:set>
                                     <p:animEffect transition="in" filter="wipe(left)">
                                       <p:cBhvr>
-                                        <p:cTn id="16" dur="500"/>
+                                        <p:cTn id="9" dur="500"/>
                                         <p:tgtEl>
                                           <p:spTgt spid="191491">
                                             <p:txEl>
@@ -3432,276 +3631,6 @@
             </p:seq>
           </p:childTnLst>
         </p:cTn>
-      </p:par>
-    </p:tnLst>
-  </p:timing>
-</p:sld>
-</file>
-
-<file path=ppt/slides/slide3.xml><?xml version="1.0" encoding="utf-8"?>
-<p:sld xmlns:a="http://schemas.openxmlformats.org/drawingml/2006/main" xmlns:r="http://schemas.openxmlformats.org/officeDocument/2006/relationships" xmlns:p="http://schemas.openxmlformats.org/presentationml/2006/main">
-  <p:cSld>
-    <p:spTree>
-      <p:nvGrpSpPr>
-        <p:cNvPr id="1" name=""/>
-        <p:cNvGrpSpPr/>
-        <p:nvPr/>
-      </p:nvGrpSpPr>
-      <p:grpSpPr>
-        <a:xfrm>
-          <a:off x="0" y="0"/>
-          <a:ext cx="0" cy="0"/>
-          <a:chOff x="0" y="0"/>
-          <a:chExt cx="0" cy="0"/>
-        </a:xfrm>
-      </p:grpSpPr>
-      <p:sp>
-        <p:nvSpPr>
-          <p:cNvPr id="4" name="Slide Number Placeholder 3"/>
-          <p:cNvSpPr>
-            <a:spLocks noGrp="1"/>
-          </p:cNvSpPr>
-          <p:nvPr>
-            <p:ph type="sldNum" sz="quarter" idx="10"/>
-          </p:nvPr>
-        </p:nvSpPr>
-        <p:spPr/>
-        <p:txBody>
-          <a:bodyPr/>
-          <a:lstStyle/>
-          <a:p>
-            <a:r>
-              <a:rPr lang="en-US" dirty="0" err="1"/>
-              <a:t>lec</a:t>
-            </a:r>
-            <a:r>
-              <a:rPr lang="en-US" dirty="0" smtClean="0"/>
-              <a:t> 8W.</a:t>
-            </a:r>
-            <a:fld id="{8CB76801-ECFD-4E75-B29A-84CDB3DBBAA0}" type="slidenum">
-              <a:rPr lang="en-US" smtClean="0"/>
-              <a:pPr/>
-              <a:t>3</a:t>
-            </a:fld>
-            <a:endParaRPr lang="en-US" dirty="0"/>
-          </a:p>
-        </p:txBody>
-      </p:sp>
-      <p:sp>
-        <p:nvSpPr>
-          <p:cNvPr id="572418" name="Rectangle 2"/>
-          <p:cNvSpPr>
-            <a:spLocks noGrp="1" noChangeArrowheads="1"/>
-          </p:cNvSpPr>
-          <p:nvPr>
-            <p:ph type="title"/>
-          </p:nvPr>
-        </p:nvSpPr>
-        <p:spPr>
-          <a:xfrm>
-            <a:off x="1772250" y="139064"/>
-            <a:ext cx="5653263" cy="1297893"/>
-          </a:xfrm>
-          <a:noFill/>
-          <a:ln/>
-        </p:spPr>
-        <p:txBody>
-          <a:bodyPr/>
-          <a:lstStyle/>
-          <a:p>
-            <a:r>
-              <a:rPr lang="en-US" sz="6600" dirty="0" smtClean="0"/>
-              <a:t>unique paths</a:t>
-            </a:r>
-            <a:endParaRPr lang="en-US" sz="6600" dirty="0"/>
-          </a:p>
-        </p:txBody>
-      </p:sp>
-      <p:sp>
-        <p:nvSpPr>
-          <p:cNvPr id="7" name="Rectangle 3"/>
-          <p:cNvSpPr txBox="1">
-            <a:spLocks noChangeArrowheads="1"/>
-          </p:cNvSpPr>
-          <p:nvPr/>
-        </p:nvSpPr>
-        <p:spPr bwMode="auto">
-          <a:xfrm>
-            <a:off x="290289" y="1901752"/>
-            <a:ext cx="8580292" cy="3096609"/>
-          </a:xfrm>
-          <a:prstGeom prst="rect">
-            <a:avLst/>
-          </a:prstGeom>
-          <a:noFill/>
-          <a:ln w="9525">
-            <a:noFill/>
-            <a:miter lim="800000"/>
-            <a:headEnd/>
-            <a:tailEnd/>
-          </a:ln>
-        </p:spPr>
-        <p:txBody>
-          <a:bodyPr vert="horz" wrap="square" lIns="91440" tIns="45720" rIns="91440" bIns="45720" numCol="1" anchor="t" anchorCtr="0" compatLnSpc="1">
-            <a:prstTxWarp prst="textNoShape">
-              <a:avLst/>
-            </a:prstTxWarp>
-          </a:bodyPr>
-          <a:lstStyle/>
-          <a:p>
-            <a:pPr marL="342900" marR="0" lvl="0" indent="-342900" algn="l" defTabSz="914400" rtl="0" eaLnBrk="1" fontAlgn="base" latinLnBrk="0" hangingPunct="1">
-              <a:lnSpc>
-                <a:spcPct val="100000"/>
-              </a:lnSpc>
-              <a:spcBef>
-                <a:spcPct val="20000"/>
-              </a:spcBef>
-              <a:spcAft>
-                <a:spcPct val="0"/>
-              </a:spcAft>
-              <a:buClrTx/>
-              <a:buSzTx/>
-              <a:buFontTx/>
-              <a:buNone/>
-              <a:tabLst/>
-              <a:defRPr/>
-            </a:pPr>
-            <a:r>
-              <a:rPr kumimoji="0" lang="en-US" altLang="zh-CN" sz="6000" b="0" i="0" u="none" strike="noStrike" kern="0" cap="none" spc="0" normalizeH="0" baseline="0" noProof="0" dirty="0" smtClean="0">
-                <a:ln>
-                  <a:noFill/>
-                </a:ln>
-                <a:solidFill>
-                  <a:srgbClr val="000000"/>
-                </a:solidFill>
-                <a:effectLst/>
-                <a:uLnTx/>
-                <a:uFillTx/>
-                <a:latin typeface="+mn-lt"/>
-                <a:ea typeface="宋体" pitchFamily="2" charset="-122"/>
-                <a:cs typeface="+mn-cs"/>
-              </a:rPr>
-              <a:t>A tree i</a:t>
-            </a:r>
-            <a:r>
-              <a:rPr kumimoji="0" lang="en-US" altLang="zh-CN" sz="6000" b="0" i="0" u="none" strike="noStrike" kern="0" cap="none" spc="0" normalizeH="0" baseline="0" noProof="0" dirty="0" smtClean="0">
-                <a:ln>
-                  <a:noFill/>
-                </a:ln>
-                <a:solidFill>
-                  <a:schemeClr val="tx1"/>
-                </a:solidFill>
-                <a:effectLst/>
-                <a:uLnTx/>
-                <a:uFillTx/>
-                <a:latin typeface="+mn-lt"/>
-                <a:ea typeface="宋体" pitchFamily="2" charset="-122"/>
-                <a:cs typeface="+mn-cs"/>
-              </a:rPr>
-              <a:t>s a g</a:t>
-            </a:r>
-            <a:r>
-              <a:rPr kumimoji="0" lang="en-US" altLang="zh-CN" sz="6000" b="0" i="0" u="none" strike="noStrike" kern="0" cap="none" spc="0" normalizeH="0" baseline="0" noProof="0" dirty="0" smtClean="0">
-                <a:ln>
-                  <a:noFill/>
-                </a:ln>
-                <a:solidFill>
-                  <a:srgbClr val="000000"/>
-                </a:solidFill>
-                <a:effectLst/>
-                <a:uLnTx/>
-                <a:uFillTx/>
-                <a:latin typeface="+mn-lt"/>
-                <a:ea typeface="宋体" pitchFamily="2" charset="-122"/>
-                <a:cs typeface="+mn-cs"/>
-              </a:rPr>
-              <a:t>raph with</a:t>
-            </a:r>
-            <a:r>
-              <a:rPr kumimoji="0" lang="en-US" altLang="zh-CN" sz="6000" b="0" i="0" u="none" strike="noStrike" kern="0" cap="none" spc="0" normalizeH="0" noProof="0" dirty="0" smtClean="0">
-                <a:ln>
-                  <a:noFill/>
-                </a:ln>
-                <a:solidFill>
-                  <a:srgbClr val="000000"/>
-                </a:solidFill>
-                <a:effectLst/>
-                <a:uLnTx/>
-                <a:uFillTx/>
-                <a:latin typeface="+mn-lt"/>
-                <a:ea typeface="宋体" pitchFamily="2" charset="-122"/>
-                <a:cs typeface="+mn-cs"/>
-              </a:rPr>
-              <a:t> </a:t>
-            </a:r>
-            <a:r>
-              <a:rPr kumimoji="0" lang="en-US" altLang="zh-CN" sz="6000" b="0" i="0" u="none" strike="noStrike" kern="0" cap="none" spc="0" normalizeH="0" noProof="0" dirty="0" smtClean="0">
-                <a:ln>
-                  <a:noFill/>
-                </a:ln>
-                <a:solidFill>
-                  <a:srgbClr val="C30778"/>
-                </a:solidFill>
-                <a:effectLst/>
-                <a:uLnTx/>
-                <a:uFillTx/>
-                <a:latin typeface="+mn-lt"/>
-                <a:ea typeface="宋体" pitchFamily="2" charset="-122"/>
-                <a:cs typeface="+mn-cs"/>
-              </a:rPr>
-              <a:t>unique paths</a:t>
-            </a:r>
-            <a:r>
-              <a:rPr kumimoji="0" lang="en-US" altLang="zh-CN" sz="6000" b="0" i="0" u="none" strike="noStrike" kern="0" cap="none" spc="0" normalizeH="0" noProof="0" dirty="0" smtClean="0">
-                <a:ln>
-                  <a:noFill/>
-                </a:ln>
-                <a:solidFill>
-                  <a:srgbClr val="000000"/>
-                </a:solidFill>
-                <a:effectLst/>
-                <a:uLnTx/>
-                <a:uFillTx/>
-                <a:latin typeface="+mn-lt"/>
-                <a:ea typeface="宋体" pitchFamily="2" charset="-122"/>
-                <a:cs typeface="+mn-cs"/>
-              </a:rPr>
-              <a:t> between every pair of vertices.</a:t>
-            </a:r>
-            <a:endParaRPr kumimoji="0" lang="en-US" altLang="zh-CN" sz="6000" b="0" i="0" u="none" strike="noStrike" kern="0" cap="none" spc="0" normalizeH="0" baseline="0" noProof="0" dirty="0" smtClean="0">
-              <a:ln>
-                <a:noFill/>
-              </a:ln>
-              <a:solidFill>
-                <a:srgbClr val="000000"/>
-              </a:solidFill>
-              <a:effectLst/>
-              <a:uLnTx/>
-              <a:uFillTx/>
-              <a:latin typeface="+mn-lt"/>
-              <a:ea typeface="宋体" pitchFamily="2" charset="-122"/>
-              <a:cs typeface="+mn-cs"/>
-            </a:endParaRPr>
-          </a:p>
-        </p:txBody>
-      </p:sp>
-    </p:spTree>
-    <p:extLst>
-      <p:ext uri="{BB962C8B-B14F-4D97-AF65-F5344CB8AC3E}">
-        <p14:creationId xmlns:p14="http://schemas.microsoft.com/office/powerpoint/2010/main" val="3363477428"/>
-      </p:ext>
-    </p:extLst>
-  </p:cSld>
-  <p:clrMapOvr>
-    <a:masterClrMapping/>
-  </p:clrMapOvr>
-  <p:transition xmlns:p14="http://schemas.microsoft.com/office/powerpoint/2010/main">
-    <p:fade thruBlk="1"/>
-  </p:transition>
-  <p:timing>
-    <p:tnLst>
-      <p:par>
-        <p:cTn xmlns:p14="http://schemas.microsoft.com/office/powerpoint/2010/main" id="1" dur="indefinite" restart="never" nodeType="tmRoot"/>
       </p:par>
     </p:tnLst>
   </p:timing>
@@ -5566,7 +5495,7 @@
                             </p:stCondLst>
                             <p:childTnLst>
                               <p:par>
-                                <p:cTn id="5" presetID="1" presetClass="entr" presetSubtype="0" fill="hold" nodeType="clickEffect">
+                                <p:cTn id="5" presetID="9" presetClass="entr" presetSubtype="0" fill="hold" nodeType="clickEffect">
                                   <p:stCondLst>
                                     <p:cond delay="0"/>
                                   </p:stCondLst>
@@ -5574,6 +5503,111 @@
                                     <p:set>
                                       <p:cBhvr>
                                         <p:cTn id="6" dur="1" fill="hold">
+                                          <p:stCondLst>
+                                            <p:cond delay="0"/>
+                                          </p:stCondLst>
+                                        </p:cTn>
+                                        <p:tgtEl>
+                                          <p:spTgt spid="193538">
+                                            <p:txEl>
+                                              <p:pRg st="0" end="0"/>
+                                            </p:txEl>
+                                          </p:spTgt>
+                                        </p:tgtEl>
+                                        <p:attrNameLst>
+                                          <p:attrName>style.visibility</p:attrName>
+                                        </p:attrNameLst>
+                                      </p:cBhvr>
+                                      <p:to>
+                                        <p:strVal val="visible"/>
+                                      </p:to>
+                                    </p:set>
+                                    <p:animEffect transition="in" filter="dissolve">
+                                      <p:cBhvr>
+                                        <p:cTn id="7" dur="500"/>
+                                        <p:tgtEl>
+                                          <p:spTgt spid="193538">
+                                            <p:txEl>
+                                              <p:pRg st="0" end="0"/>
+                                            </p:txEl>
+                                          </p:spTgt>
+                                        </p:tgtEl>
+                                      </p:cBhvr>
+                                    </p:animEffect>
+                                  </p:childTnLst>
+                                </p:cTn>
+                              </p:par>
+                            </p:childTnLst>
+                          </p:cTn>
+                        </p:par>
+                        <p:par>
+                          <p:cTn id="8" fill="hold">
+                            <p:stCondLst>
+                              <p:cond delay="500"/>
+                            </p:stCondLst>
+                            <p:childTnLst>
+                              <p:par>
+                                <p:cTn id="9" presetID="22" presetClass="entr" presetSubtype="2" fill="hold" nodeType="afterEffect">
+                                  <p:stCondLst>
+                                    <p:cond delay="0"/>
+                                  </p:stCondLst>
+                                  <p:childTnLst>
+                                    <p:set>
+                                      <p:cBhvr>
+                                        <p:cTn id="10" dur="1" fill="hold">
+                                          <p:stCondLst>
+                                            <p:cond delay="0"/>
+                                          </p:stCondLst>
+                                        </p:cTn>
+                                        <p:tgtEl>
+                                          <p:spTgt spid="2"/>
+                                        </p:tgtEl>
+                                        <p:attrNameLst>
+                                          <p:attrName>style.visibility</p:attrName>
+                                        </p:attrNameLst>
+                                      </p:cBhvr>
+                                      <p:to>
+                                        <p:strVal val="visible"/>
+                                      </p:to>
+                                    </p:set>
+                                    <p:animEffect transition="in" filter="wipe(right)">
+                                      <p:cBhvr>
+                                        <p:cTn id="11" dur="1000"/>
+                                        <p:tgtEl>
+                                          <p:spTgt spid="2"/>
+                                        </p:tgtEl>
+                                      </p:cBhvr>
+                                    </p:animEffect>
+                                  </p:childTnLst>
+                                </p:cTn>
+                              </p:par>
+                            </p:childTnLst>
+                          </p:cTn>
+                        </p:par>
+                      </p:childTnLst>
+                    </p:cTn>
+                  </p:par>
+                  <p:par>
+                    <p:cTn id="12" fill="hold">
+                      <p:stCondLst>
+                        <p:cond delay="indefinite"/>
+                      </p:stCondLst>
+                      <p:childTnLst>
+                        <p:par>
+                          <p:cTn id="13" fill="hold">
+                            <p:stCondLst>
+                              <p:cond delay="0"/>
+                            </p:stCondLst>
+                            <p:childTnLst>
+                              <p:par>
+                                <p:cTn id="14" presetID="9" presetClass="entr" presetSubtype="0" fill="hold" nodeType="clickEffect">
+                                  <p:stCondLst>
+                                    <p:cond delay="0"/>
+                                  </p:stCondLst>
+                                  <p:childTnLst>
+                                    <p:set>
+                                      <p:cBhvr>
+                                        <p:cTn id="15" dur="1" fill="hold">
                                           <p:stCondLst>
                                             <p:cond delay="0"/>
                                           </p:stCondLst>
@@ -5593,18 +5627,48 @@
                                         <p:strVal val="visible"/>
                                       </p:to>
                                     </p:set>
+                                    <p:animEffect transition="in" filter="dissolve">
+                                      <p:cBhvr>
+                                        <p:cTn id="16" dur="500"/>
+                                        <p:tgtEl>
+                                          <p:spTgt spid="193538">
+                                            <p:txEl>
+                                              <p:pRg st="1" end="1"/>
+                                            </p:txEl>
+                                          </p:spTgt>
+                                        </p:tgtEl>
+                                      </p:cBhvr>
+                                    </p:animEffect>
                                   </p:childTnLst>
                                 </p:cTn>
                               </p:par>
+                            </p:childTnLst>
+                          </p:cTn>
+                        </p:par>
+                      </p:childTnLst>
+                    </p:cTn>
+                  </p:par>
+                  <p:par>
+                    <p:cTn id="17" fill="hold">
+                      <p:stCondLst>
+                        <p:cond delay="indefinite"/>
+                      </p:stCondLst>
+                      <p:childTnLst>
+                        <p:par>
+                          <p:cTn id="18" fill="hold">
+                            <p:stCondLst>
+                              <p:cond delay="0"/>
+                            </p:stCondLst>
+                            <p:childTnLst>
                               <p:par>
-                                <p:cTn id="7" presetID="1" presetClass="entr" presetSubtype="0" fill="hold" nodeType="withEffect">
+                                <p:cTn id="19" presetID="22" presetClass="entr" presetSubtype="8" fill="hold" nodeType="clickEffect">
                                   <p:stCondLst>
                                     <p:cond delay="0"/>
                                   </p:stCondLst>
                                   <p:childTnLst>
                                     <p:set>
                                       <p:cBhvr>
-                                        <p:cTn id="8" dur="1" fill="hold">
+                                        <p:cTn id="20" dur="1" fill="hold">
                                           <p:stCondLst>
                                             <p:cond delay="0"/>
                                           </p:stCondLst>
@@ -5624,18 +5688,39 @@
                                         <p:strVal val="visible"/>
                                       </p:to>
                                     </p:set>
+                                    <p:animEffect transition="in" filter="wipe(left)">
+                                      <p:cBhvr>
+                                        <p:cTn id="21" dur="500"/>
+                                        <p:tgtEl>
+                                          <p:spTgt spid="193538">
+                                            <p:txEl>
+                                              <p:pRg st="2" end="2"/>
+                                            </p:txEl>
+                                          </p:spTgt>
+                                        </p:tgtEl>
+                                      </p:cBhvr>
+                                    </p:animEffect>
                                   </p:childTnLst>
                                 </p:cTn>
                               </p:par>
+                            </p:childTnLst>
+                          </p:cTn>
+                        </p:par>
+                        <p:par>
+                          <p:cTn id="22" fill="hold">
+                            <p:stCondLst>
+                              <p:cond delay="500"/>
+                            </p:stCondLst>
+                            <p:childTnLst>
                               <p:par>
-                                <p:cTn id="9" presetID="3" presetClass="entr" presetSubtype="10" fill="hold" grpId="0" nodeType="withEffect">
+                                <p:cTn id="23" presetID="9" presetClass="entr" presetSubtype="0" fill="hold" grpId="0" nodeType="afterEffect">
                                   <p:stCondLst>
                                     <p:cond delay="0"/>
                                   </p:stCondLst>
                                   <p:childTnLst>
                                     <p:set>
                                       <p:cBhvr>
-                                        <p:cTn id="10" dur="1" fill="hold">
+                                        <p:cTn id="24" dur="1" fill="hold">
                                           <p:stCondLst>
                                             <p:cond delay="0"/>
                                           </p:stCondLst>
@@ -5651,9 +5736,9 @@
                                         <p:strVal val="visible"/>
                                       </p:to>
                                     </p:set>
-                                    <p:animEffect transition="in" filter="blinds(horizontal)">
+                                    <p:animEffect transition="in" filter="dissolve">
                                       <p:cBhvr>
-                                        <p:cTn id="11" dur="500"/>
+                                        <p:cTn id="25" dur="500"/>
                                         <p:tgtEl>
                                           <p:spTgt spid="193578"/>
                                         </p:tgtEl>
@@ -5662,15 +5747,24 @@
                                   </p:childTnLst>
                                 </p:cTn>
                               </p:par>
+                            </p:childTnLst>
+                          </p:cTn>
+                        </p:par>
+                        <p:par>
+                          <p:cTn id="26" fill="hold">
+                            <p:stCondLst>
+                              <p:cond delay="1000"/>
+                            </p:stCondLst>
+                            <p:childTnLst>
                               <p:par>
-                                <p:cTn id="12" presetID="1" presetClass="entr" presetSubtype="0" fill="hold" grpId="0" nodeType="withEffect">
+                                <p:cTn id="27" presetID="9" presetClass="entr" presetSubtype="0" fill="hold" grpId="0" nodeType="afterEffect">
                                   <p:stCondLst>
                                     <p:cond delay="0"/>
                                   </p:stCondLst>
                                   <p:childTnLst>
                                     <p:set>
                                       <p:cBhvr>
-                                        <p:cTn id="13" dur="1" fill="hold">
+                                        <p:cTn id="28" dur="1" fill="hold">
                                           <p:stCondLst>
                                             <p:cond delay="0"/>
                                           </p:stCondLst>
@@ -5686,18 +5780,44 @@
                                         <p:strVal val="visible"/>
                                       </p:to>
                                     </p:set>
+                                    <p:animEffect transition="in" filter="dissolve">
+                                      <p:cBhvr>
+                                        <p:cTn id="29" dur="500"/>
+                                        <p:tgtEl>
+                                          <p:spTgt spid="193577"/>
+                                        </p:tgtEl>
+                                      </p:cBhvr>
+                                    </p:animEffect>
                                   </p:childTnLst>
                                 </p:cTn>
                               </p:par>
+                            </p:childTnLst>
+                          </p:cTn>
+                        </p:par>
+                      </p:childTnLst>
+                    </p:cTn>
+                  </p:par>
+                  <p:par>
+                    <p:cTn id="30" fill="hold">
+                      <p:stCondLst>
+                        <p:cond delay="indefinite"/>
+                      </p:stCondLst>
+                      <p:childTnLst>
+                        <p:par>
+                          <p:cTn id="31" fill="hold">
+                            <p:stCondLst>
+                              <p:cond delay="0"/>
+                            </p:stCondLst>
+                            <p:childTnLst>
                               <p:par>
-                                <p:cTn id="14" presetID="1" presetClass="entr" presetSubtype="0" fill="hold" nodeType="withEffect">
+                                <p:cTn id="32" presetID="22" presetClass="entr" presetSubtype="8" fill="hold" nodeType="clickEffect">
                                   <p:stCondLst>
                                     <p:cond delay="0"/>
                                   </p:stCondLst>
                                   <p:childTnLst>
                                     <p:set>
                                       <p:cBhvr>
-                                        <p:cTn id="15" dur="1" fill="hold">
+                                        <p:cTn id="33" dur="1" fill="hold">
                                           <p:stCondLst>
                                             <p:cond delay="0"/>
                                           </p:stCondLst>
@@ -5717,18 +5837,30 @@
                                         <p:strVal val="visible"/>
                                       </p:to>
                                     </p:set>
+                                    <p:animEffect transition="in" filter="wipe(left)">
+                                      <p:cBhvr>
+                                        <p:cTn id="34" dur="500"/>
+                                        <p:tgtEl>
+                                          <p:spTgt spid="193538">
+                                            <p:txEl>
+                                              <p:pRg st="3" end="3"/>
+                                            </p:txEl>
+                                          </p:spTgt>
+                                        </p:tgtEl>
+                                      </p:cBhvr>
+                                    </p:animEffect>
                                   </p:childTnLst>
                                 </p:cTn>
                               </p:par>
                               <p:par>
-                                <p:cTn id="16" presetID="1" presetClass="entr" presetSubtype="0" fill="hold" grpId="0" nodeType="withEffect">
+                                <p:cTn id="35" presetID="9" presetClass="entr" presetSubtype="0" fill="hold" grpId="0" nodeType="withEffect">
                                   <p:stCondLst>
                                     <p:cond delay="0"/>
                                   </p:stCondLst>
                                   <p:childTnLst>
                                     <p:set>
                                       <p:cBhvr>
-                                        <p:cTn id="17" dur="1" fill="hold">
+                                        <p:cTn id="36" dur="1" fill="hold">
                                           <p:stCondLst>
                                             <p:cond delay="0"/>
                                           </p:stCondLst>
@@ -5744,36 +5876,35 @@
                                         <p:strVal val="visible"/>
                                       </p:to>
                                     </p:set>
+                                    <p:animEffect transition="in" filter="dissolve">
+                                      <p:cBhvr>
+                                        <p:cTn id="37" dur="500"/>
+                                        <p:tgtEl>
+                                          <p:spTgt spid="193579"/>
+                                        </p:tgtEl>
+                                      </p:cBhvr>
+                                    </p:animEffect>
                                   </p:childTnLst>
                                 </p:cTn>
                               </p:par>
                             </p:childTnLst>
                           </p:cTn>
                         </p:par>
-                      </p:childTnLst>
-                    </p:cTn>
-                  </p:par>
-                  <p:par>
-                    <p:cTn id="18" fill="hold">
-                      <p:stCondLst>
-                        <p:cond delay="indefinite"/>
-                      </p:stCondLst>
-                      <p:childTnLst>
                         <p:par>
-                          <p:cTn id="19" fill="hold">
+                          <p:cTn id="38" fill="hold">
                             <p:stCondLst>
-                              <p:cond delay="0"/>
+                              <p:cond delay="500"/>
                             </p:stCondLst>
                             <p:childTnLst>
                               <p:par>
-                                <p:cTn id="20" presetID="1" presetClass="entr" presetSubtype="0" fill="hold" nodeType="clickEffect">
+                                <p:cTn id="39" presetID="9" presetClass="entr" presetSubtype="0" fill="hold" nodeType="afterEffect">
                                   <p:stCondLst>
                                     <p:cond delay="0"/>
                                   </p:stCondLst>
                                   <p:childTnLst>
                                     <p:set>
                                       <p:cBhvr>
-                                        <p:cTn id="21" dur="1" fill="hold">
+                                        <p:cTn id="40" dur="1" fill="hold">
                                           <p:stCondLst>
                                             <p:cond delay="0"/>
                                           </p:stCondLst>
@@ -5789,6 +5920,14 @@
                                         <p:strVal val="visible"/>
                                       </p:to>
                                     </p:set>
+                                    <p:animEffect transition="in" filter="dissolve">
+                                      <p:cBhvr>
+                                        <p:cTn id="41" dur="500"/>
+                                        <p:tgtEl>
+                                          <p:spTgt spid="5"/>
+                                        </p:tgtEl>
+                                      </p:cBhvr>
+                                    </p:animEffect>
                                   </p:childTnLst>
                                 </p:cTn>
                               </p:par>
@@ -5799,26 +5938,26 @@
                     </p:cTn>
                   </p:par>
                   <p:par>
-                    <p:cTn id="22" fill="hold">
+                    <p:cTn id="42" fill="hold">
                       <p:stCondLst>
                         <p:cond delay="indefinite"/>
                       </p:stCondLst>
                       <p:childTnLst>
                         <p:par>
-                          <p:cTn id="23" fill="hold">
+                          <p:cTn id="43" fill="hold">
                             <p:stCondLst>
                               <p:cond delay="0"/>
                             </p:stCondLst>
                             <p:childTnLst>
                               <p:par>
-                                <p:cTn id="24" presetID="1" presetClass="entr" presetSubtype="0" fill="hold" nodeType="clickEffect">
+                                <p:cTn id="44" presetID="9" presetClass="entr" presetSubtype="0" fill="hold" nodeType="clickEffect">
                                   <p:stCondLst>
                                     <p:cond delay="0"/>
                                   </p:stCondLst>
                                   <p:childTnLst>
                                     <p:set>
                                       <p:cBhvr>
-                                        <p:cTn id="25" dur="1" fill="hold">
+                                        <p:cTn id="45" dur="1" fill="hold">
                                           <p:stCondLst>
                                             <p:cond delay="0"/>
                                           </p:stCondLst>
@@ -5834,6 +5973,14 @@
                                         <p:strVal val="visible"/>
                                       </p:to>
                                     </p:set>
+                                    <p:animEffect transition="in" filter="dissolve">
+                                      <p:cBhvr>
+                                        <p:cTn id="46" dur="500"/>
+                                        <p:tgtEl>
+                                          <p:spTgt spid="6"/>
+                                        </p:tgtEl>
+                                      </p:cBhvr>
+                                    </p:animEffect>
                                   </p:childTnLst>
                                 </p:cTn>
                               </p:par>
@@ -5844,26 +5991,26 @@
                     </p:cTn>
                   </p:par>
                   <p:par>
-                    <p:cTn id="26" fill="hold">
+                    <p:cTn id="47" fill="hold">
                       <p:stCondLst>
                         <p:cond delay="indefinite"/>
                       </p:stCondLst>
                       <p:childTnLst>
                         <p:par>
-                          <p:cTn id="27" fill="hold">
+                          <p:cTn id="48" fill="hold">
                             <p:stCondLst>
                               <p:cond delay="0"/>
                             </p:stCondLst>
                             <p:childTnLst>
                               <p:par>
-                                <p:cTn id="28" presetID="1" presetClass="entr" presetSubtype="0" fill="hold" grpId="0" nodeType="clickEffect">
+                                <p:cTn id="49" presetID="9" presetClass="entr" presetSubtype="0" fill="hold" grpId="0" nodeType="clickEffect">
                                   <p:stCondLst>
                                     <p:cond delay="0"/>
                                   </p:stCondLst>
                                   <p:childTnLst>
                                     <p:set>
                                       <p:cBhvr>
-                                        <p:cTn id="29" dur="1" fill="hold">
+                                        <p:cTn id="50" dur="1" fill="hold">
                                           <p:stCondLst>
                                             <p:cond delay="0"/>
                                           </p:stCondLst>
@@ -5879,6 +6026,14 @@
                                         <p:strVal val="visible"/>
                                       </p:to>
                                     </p:set>
+                                    <p:animEffect transition="in" filter="dissolve">
+                                      <p:cBhvr>
+                                        <p:cTn id="51" dur="500"/>
+                                        <p:tgtEl>
+                                          <p:spTgt spid="193589"/>
+                                        </p:tgtEl>
+                                      </p:cBhvr>
+                                    </p:animEffect>
                                   </p:childTnLst>
                                 </p:cTn>
                               </p:par>

</xml_diff>